<commit_message>
Service - NodePort - cmds (2)
</commit_message>
<xml_diff>
--- a/docs/images/pod-vs-service.pptx
+++ b/docs/images/pod-vs-service.pptx
@@ -3349,13 +3349,13 @@
               <a:t>    </a:t>
             </a:r>
             <a:r>
-              <a:rPr lang="en-GB" sz="1800" dirty="0">
+              <a:rPr lang="en-GB" sz="1800" dirty="0" err="1">
                 <a:solidFill>
                   <a:srgbClr val="569CD6"/>
                 </a:solidFill>
                 <a:latin typeface="Consolas" panose="020B0609020204030204" pitchFamily="49" charset="0"/>
               </a:rPr>
-              <a:t>protocol</a:t>
+              <a:t>targetPort</a:t>
             </a:r>
             <a:r>
               <a:rPr lang="en-GB" sz="1800" dirty="0">
@@ -3369,11 +3369,11 @@
             <a:r>
               <a:rPr lang="en-GB" sz="1800" dirty="0">
                 <a:solidFill>
-                  <a:srgbClr val="CE9178"/>
-                </a:solidFill>
-                <a:latin typeface="Consolas" panose="020B0609020204030204" pitchFamily="49" charset="0"/>
-              </a:rPr>
-              <a:t>TCP</a:t>
+                  <a:srgbClr val="B5CEA8"/>
+                </a:solidFill>
+                <a:latin typeface="Consolas" panose="020B0609020204030204" pitchFamily="49" charset="0"/>
+              </a:rPr>
+              <a:t>80</a:t>
             </a:r>
             <a:endParaRPr lang="en-GB" sz="1800" dirty="0">
               <a:solidFill>
@@ -3404,7 +3404,7 @@
                 </a:solidFill>
                 <a:latin typeface="Consolas" panose="020B0609020204030204" pitchFamily="49" charset="0"/>
               </a:rPr>
-              <a:t>targetPort</a:t>
+              <a:t>nodePort</a:t>
             </a:r>
             <a:r>
               <a:rPr lang="en-GB" sz="1800" dirty="0">
@@ -3422,7 +3422,7 @@
                 </a:solidFill>
                 <a:latin typeface="Consolas" panose="020B0609020204030204" pitchFamily="49" charset="0"/>
               </a:rPr>
-              <a:t>80</a:t>
+              <a:t>30008</a:t>
             </a:r>
             <a:endParaRPr lang="en-GB" sz="1800" dirty="0">
               <a:solidFill>
@@ -4735,13 +4735,13 @@
               <a:t>    </a:t>
             </a:r>
             <a:r>
-              <a:rPr lang="en-GB" sz="1800" dirty="0">
+              <a:rPr lang="en-GB" sz="1800" dirty="0" err="1">
                 <a:solidFill>
                   <a:srgbClr val="569CD6"/>
                 </a:solidFill>
                 <a:latin typeface="Consolas" panose="020B0609020204030204" pitchFamily="49" charset="0"/>
               </a:rPr>
-              <a:t>protocol</a:t>
+              <a:t>targetPort</a:t>
             </a:r>
             <a:r>
               <a:rPr lang="en-GB" sz="1800" dirty="0">
@@ -4755,11 +4755,11 @@
             <a:r>
               <a:rPr lang="en-GB" sz="1800" dirty="0">
                 <a:solidFill>
-                  <a:srgbClr val="CE9178"/>
-                </a:solidFill>
-                <a:latin typeface="Consolas" panose="020B0609020204030204" pitchFamily="49" charset="0"/>
-              </a:rPr>
-              <a:t>TCP</a:t>
+                  <a:srgbClr val="B5CEA8"/>
+                </a:solidFill>
+                <a:latin typeface="Consolas" panose="020B0609020204030204" pitchFamily="49" charset="0"/>
+              </a:rPr>
+              <a:t>80</a:t>
             </a:r>
             <a:endParaRPr lang="en-GB" sz="1800" dirty="0">
               <a:solidFill>
@@ -4790,7 +4790,7 @@
                 </a:solidFill>
                 <a:latin typeface="Consolas" panose="020B0609020204030204" pitchFamily="49" charset="0"/>
               </a:rPr>
-              <a:t>targetPort</a:t>
+              <a:t>nodePort</a:t>
             </a:r>
             <a:r>
               <a:rPr lang="en-GB" sz="1800" dirty="0">
@@ -4808,7 +4808,7 @@
                 </a:solidFill>
                 <a:latin typeface="Consolas" panose="020B0609020204030204" pitchFamily="49" charset="0"/>
               </a:rPr>
-              <a:t>80</a:t>
+              <a:t>30008</a:t>
             </a:r>
             <a:endParaRPr lang="en-GB" sz="1800" dirty="0">
               <a:solidFill>

</xml_diff>

<commit_message>
Application Lifecycle Management and Kubernetes Services
</commit_message>
<xml_diff>
--- a/docs/images/pod-vs-service.pptx
+++ b/docs/images/pod-vs-service.pptx
@@ -7,6 +7,7 @@
   <p:sldIdLst>
     <p:sldId id="259" r:id="rId2"/>
     <p:sldId id="260" r:id="rId3"/>
+    <p:sldId id="261" r:id="rId4"/>
   </p:sldIdLst>
   <p:sldSz cx="12192000" cy="6858000"/>
   <p:notesSz cx="6858000" cy="9144000"/>
@@ -244,7 +245,7 @@
           <a:p>
             <a:fld id="{7F7B62DA-8992-4475-B647-5FA8317943B2}" type="datetimeFigureOut">
               <a:rPr lang="en-GB" smtClean="0"/>
-              <a:t>27/04/2021</a:t>
+              <a:t>01/05/2021</a:t>
             </a:fld>
             <a:endParaRPr lang="en-GB"/>
           </a:p>
@@ -414,7 +415,7 @@
           <a:p>
             <a:fld id="{7F7B62DA-8992-4475-B647-5FA8317943B2}" type="datetimeFigureOut">
               <a:rPr lang="en-GB" smtClean="0"/>
-              <a:t>27/04/2021</a:t>
+              <a:t>01/05/2021</a:t>
             </a:fld>
             <a:endParaRPr lang="en-GB"/>
           </a:p>
@@ -594,7 +595,7 @@
           <a:p>
             <a:fld id="{7F7B62DA-8992-4475-B647-5FA8317943B2}" type="datetimeFigureOut">
               <a:rPr lang="en-GB" smtClean="0"/>
-              <a:t>27/04/2021</a:t>
+              <a:t>01/05/2021</a:t>
             </a:fld>
             <a:endParaRPr lang="en-GB"/>
           </a:p>
@@ -764,7 +765,7 @@
           <a:p>
             <a:fld id="{7F7B62DA-8992-4475-B647-5FA8317943B2}" type="datetimeFigureOut">
               <a:rPr lang="en-GB" smtClean="0"/>
-              <a:t>27/04/2021</a:t>
+              <a:t>01/05/2021</a:t>
             </a:fld>
             <a:endParaRPr lang="en-GB"/>
           </a:p>
@@ -1010,7 +1011,7 @@
           <a:p>
             <a:fld id="{7F7B62DA-8992-4475-B647-5FA8317943B2}" type="datetimeFigureOut">
               <a:rPr lang="en-GB" smtClean="0"/>
-              <a:t>27/04/2021</a:t>
+              <a:t>01/05/2021</a:t>
             </a:fld>
             <a:endParaRPr lang="en-GB"/>
           </a:p>
@@ -1242,7 +1243,7 @@
           <a:p>
             <a:fld id="{7F7B62DA-8992-4475-B647-5FA8317943B2}" type="datetimeFigureOut">
               <a:rPr lang="en-GB" smtClean="0"/>
-              <a:t>27/04/2021</a:t>
+              <a:t>01/05/2021</a:t>
             </a:fld>
             <a:endParaRPr lang="en-GB"/>
           </a:p>
@@ -1609,7 +1610,7 @@
           <a:p>
             <a:fld id="{7F7B62DA-8992-4475-B647-5FA8317943B2}" type="datetimeFigureOut">
               <a:rPr lang="en-GB" smtClean="0"/>
-              <a:t>27/04/2021</a:t>
+              <a:t>01/05/2021</a:t>
             </a:fld>
             <a:endParaRPr lang="en-GB"/>
           </a:p>
@@ -1727,7 +1728,7 @@
           <a:p>
             <a:fld id="{7F7B62DA-8992-4475-B647-5FA8317943B2}" type="datetimeFigureOut">
               <a:rPr lang="en-GB" smtClean="0"/>
-              <a:t>27/04/2021</a:t>
+              <a:t>01/05/2021</a:t>
             </a:fld>
             <a:endParaRPr lang="en-GB"/>
           </a:p>
@@ -1822,7 +1823,7 @@
           <a:p>
             <a:fld id="{7F7B62DA-8992-4475-B647-5FA8317943B2}" type="datetimeFigureOut">
               <a:rPr lang="en-GB" smtClean="0"/>
-              <a:t>27/04/2021</a:t>
+              <a:t>01/05/2021</a:t>
             </a:fld>
             <a:endParaRPr lang="en-GB"/>
           </a:p>
@@ -2099,7 +2100,7 @@
           <a:p>
             <a:fld id="{7F7B62DA-8992-4475-B647-5FA8317943B2}" type="datetimeFigureOut">
               <a:rPr lang="en-GB" smtClean="0"/>
-              <a:t>27/04/2021</a:t>
+              <a:t>01/05/2021</a:t>
             </a:fld>
             <a:endParaRPr lang="en-GB"/>
           </a:p>
@@ -2352,7 +2353,7 @@
           <a:p>
             <a:fld id="{7F7B62DA-8992-4475-B647-5FA8317943B2}" type="datetimeFigureOut">
               <a:rPr lang="en-GB" smtClean="0"/>
-              <a:t>27/04/2021</a:t>
+              <a:t>01/05/2021</a:t>
             </a:fld>
             <a:endParaRPr lang="en-GB"/>
           </a:p>
@@ -2565,7 +2566,7 @@
           <a:p>
             <a:fld id="{7F7B62DA-8992-4475-B647-5FA8317943B2}" type="datetimeFigureOut">
               <a:rPr lang="en-GB" smtClean="0"/>
-              <a:t>27/04/2021</a:t>
+              <a:t>01/05/2021</a:t>
             </a:fld>
             <a:endParaRPr lang="en-GB"/>
           </a:p>
@@ -5205,6 +5206,277 @@
 </p:sld>
 </file>
 
+<file path=ppt/slides/slide3.xml><?xml version="1.0" encoding="utf-8"?>
+<p:sld xmlns:a="http://schemas.openxmlformats.org/drawingml/2006/main" xmlns:r="http://schemas.openxmlformats.org/officeDocument/2006/relationships" xmlns:p="http://schemas.openxmlformats.org/presentationml/2006/main">
+  <p:cSld>
+    <p:spTree>
+      <p:nvGrpSpPr>
+        <p:cNvPr id="1" name=""/>
+        <p:cNvGrpSpPr/>
+        <p:nvPr/>
+      </p:nvGrpSpPr>
+      <p:grpSpPr>
+        <a:xfrm>
+          <a:off x="0" y="0"/>
+          <a:ext cx="0" cy="0"/>
+          <a:chOff x="0" y="0"/>
+          <a:chExt cx="0" cy="0"/>
+        </a:xfrm>
+      </p:grpSpPr>
+      <p:pic>
+        <p:nvPicPr>
+          <p:cNvPr id="4" name="Picture 3"/>
+          <p:cNvPicPr>
+            <a:picLocks noChangeAspect="1"/>
+          </p:cNvPicPr>
+          <p:nvPr/>
+        </p:nvPicPr>
+        <p:blipFill>
+          <a:blip r:embed="rId2">
+            <a:extLst>
+              <a:ext uri="{28A0092B-C50C-407E-A947-70E740481C1C}">
+                <a14:useLocalDpi xmlns:a14="http://schemas.microsoft.com/office/drawing/2010/main" val="0"/>
+              </a:ext>
+            </a:extLst>
+          </a:blip>
+          <a:stretch>
+            <a:fillRect/>
+          </a:stretch>
+        </p:blipFill>
+        <p:spPr>
+          <a:xfrm>
+            <a:off x="1082596" y="0"/>
+            <a:ext cx="9994707" cy="6836045"/>
+          </a:xfrm>
+          <a:prstGeom prst="rect">
+            <a:avLst/>
+          </a:prstGeom>
+        </p:spPr>
+      </p:pic>
+      <p:cxnSp>
+        <p:nvCxnSpPr>
+          <p:cNvPr id="6" name="Straight Arrow Connector 5"/>
+          <p:cNvCxnSpPr/>
+          <p:nvPr/>
+        </p:nvCxnSpPr>
+        <p:spPr>
+          <a:xfrm>
+            <a:off x="4749800" y="1498600"/>
+            <a:ext cx="0" cy="1286933"/>
+          </a:xfrm>
+          <a:prstGeom prst="straightConnector1">
+            <a:avLst/>
+          </a:prstGeom>
+          <a:ln w="19050">
+            <a:prstDash val="dashDot"/>
+            <a:tailEnd type="triangle"/>
+          </a:ln>
+        </p:spPr>
+        <p:style>
+          <a:lnRef idx="1">
+            <a:schemeClr val="accent1"/>
+          </a:lnRef>
+          <a:fillRef idx="0">
+            <a:schemeClr val="accent1"/>
+          </a:fillRef>
+          <a:effectRef idx="0">
+            <a:schemeClr val="accent1"/>
+          </a:effectRef>
+          <a:fontRef idx="minor">
+            <a:schemeClr val="tx1"/>
+          </a:fontRef>
+        </p:style>
+      </p:cxnSp>
+      <p:cxnSp>
+        <p:nvCxnSpPr>
+          <p:cNvPr id="14" name="Straight Arrow Connector 13"/>
+          <p:cNvCxnSpPr/>
+          <p:nvPr/>
+        </p:nvCxnSpPr>
+        <p:spPr>
+          <a:xfrm>
+            <a:off x="4749800" y="1498600"/>
+            <a:ext cx="2370667" cy="1210733"/>
+          </a:xfrm>
+          <a:prstGeom prst="straightConnector1">
+            <a:avLst/>
+          </a:prstGeom>
+          <a:ln w="19050">
+            <a:prstDash val="dashDot"/>
+            <a:tailEnd type="triangle"/>
+          </a:ln>
+        </p:spPr>
+        <p:style>
+          <a:lnRef idx="1">
+            <a:schemeClr val="accent1"/>
+          </a:lnRef>
+          <a:fillRef idx="0">
+            <a:schemeClr val="accent1"/>
+          </a:fillRef>
+          <a:effectRef idx="0">
+            <a:schemeClr val="accent1"/>
+          </a:effectRef>
+          <a:fontRef idx="minor">
+            <a:schemeClr val="tx1"/>
+          </a:fontRef>
+        </p:style>
+      </p:cxnSp>
+      <p:cxnSp>
+        <p:nvCxnSpPr>
+          <p:cNvPr id="18" name="Straight Arrow Connector 17"/>
+          <p:cNvCxnSpPr/>
+          <p:nvPr/>
+        </p:nvCxnSpPr>
+        <p:spPr>
+          <a:xfrm>
+            <a:off x="4749800" y="1498600"/>
+            <a:ext cx="4546600" cy="1210733"/>
+          </a:xfrm>
+          <a:prstGeom prst="straightConnector1">
+            <a:avLst/>
+          </a:prstGeom>
+          <a:ln w="19050">
+            <a:prstDash val="dashDot"/>
+            <a:tailEnd type="triangle"/>
+          </a:ln>
+        </p:spPr>
+        <p:style>
+          <a:lnRef idx="1">
+            <a:schemeClr val="accent1"/>
+          </a:lnRef>
+          <a:fillRef idx="0">
+            <a:schemeClr val="accent1"/>
+          </a:fillRef>
+          <a:effectRef idx="0">
+            <a:schemeClr val="accent1"/>
+          </a:effectRef>
+          <a:fontRef idx="minor">
+            <a:schemeClr val="tx1"/>
+          </a:fontRef>
+        </p:style>
+      </p:cxnSp>
+      <p:cxnSp>
+        <p:nvCxnSpPr>
+          <p:cNvPr id="23" name="Straight Arrow Connector 22"/>
+          <p:cNvCxnSpPr/>
+          <p:nvPr/>
+        </p:nvCxnSpPr>
+        <p:spPr>
+          <a:xfrm>
+            <a:off x="4732867" y="3945463"/>
+            <a:ext cx="0" cy="1286933"/>
+          </a:xfrm>
+          <a:prstGeom prst="straightConnector1">
+            <a:avLst/>
+          </a:prstGeom>
+          <a:ln w="19050">
+            <a:prstDash val="dashDot"/>
+            <a:tailEnd type="triangle"/>
+          </a:ln>
+        </p:spPr>
+        <p:style>
+          <a:lnRef idx="1">
+            <a:schemeClr val="accent1"/>
+          </a:lnRef>
+          <a:fillRef idx="0">
+            <a:schemeClr val="accent1"/>
+          </a:fillRef>
+          <a:effectRef idx="0">
+            <a:schemeClr val="accent1"/>
+          </a:effectRef>
+          <a:fontRef idx="minor">
+            <a:schemeClr val="tx1"/>
+          </a:fontRef>
+        </p:style>
+      </p:cxnSp>
+      <p:cxnSp>
+        <p:nvCxnSpPr>
+          <p:cNvPr id="24" name="Straight Arrow Connector 23"/>
+          <p:cNvCxnSpPr/>
+          <p:nvPr/>
+        </p:nvCxnSpPr>
+        <p:spPr>
+          <a:xfrm>
+            <a:off x="4724395" y="4013215"/>
+            <a:ext cx="2370667" cy="1210733"/>
+          </a:xfrm>
+          <a:prstGeom prst="straightConnector1">
+            <a:avLst/>
+          </a:prstGeom>
+          <a:ln w="19050">
+            <a:prstDash val="dashDot"/>
+            <a:tailEnd type="triangle"/>
+          </a:ln>
+        </p:spPr>
+        <p:style>
+          <a:lnRef idx="1">
+            <a:schemeClr val="accent1"/>
+          </a:lnRef>
+          <a:fillRef idx="0">
+            <a:schemeClr val="accent1"/>
+          </a:fillRef>
+          <a:effectRef idx="0">
+            <a:schemeClr val="accent1"/>
+          </a:effectRef>
+          <a:fontRef idx="minor">
+            <a:schemeClr val="tx1"/>
+          </a:fontRef>
+        </p:style>
+      </p:cxnSp>
+      <p:cxnSp>
+        <p:nvCxnSpPr>
+          <p:cNvPr id="25" name="Straight Arrow Connector 24"/>
+          <p:cNvCxnSpPr/>
+          <p:nvPr/>
+        </p:nvCxnSpPr>
+        <p:spPr>
+          <a:xfrm>
+            <a:off x="4724398" y="3996275"/>
+            <a:ext cx="4546600" cy="1210733"/>
+          </a:xfrm>
+          <a:prstGeom prst="straightConnector1">
+            <a:avLst/>
+          </a:prstGeom>
+          <a:ln w="19050">
+            <a:prstDash val="dashDot"/>
+            <a:tailEnd type="triangle"/>
+          </a:ln>
+        </p:spPr>
+        <p:style>
+          <a:lnRef idx="1">
+            <a:schemeClr val="accent1"/>
+          </a:lnRef>
+          <a:fillRef idx="0">
+            <a:schemeClr val="accent1"/>
+          </a:fillRef>
+          <a:effectRef idx="0">
+            <a:schemeClr val="accent1"/>
+          </a:effectRef>
+          <a:fontRef idx="minor">
+            <a:schemeClr val="tx1"/>
+          </a:fontRef>
+        </p:style>
+      </p:cxnSp>
+    </p:spTree>
+    <p:extLst>
+      <p:ext uri="{BB962C8B-B14F-4D97-AF65-F5344CB8AC3E}">
+        <p14:creationId xmlns:p14="http://schemas.microsoft.com/office/powerpoint/2010/main" val="2063092107"/>
+      </p:ext>
+    </p:extLst>
+  </p:cSld>
+  <p:clrMapOvr>
+    <a:masterClrMapping/>
+  </p:clrMapOvr>
+  <p:timing>
+    <p:tnLst>
+      <p:par>
+        <p:cTn id="1" dur="indefinite" restart="never" nodeType="tmRoot"/>
+      </p:par>
+    </p:tnLst>
+  </p:timing>
+</p:sld>
+</file>
+
 <file path=ppt/theme/theme1.xml><?xml version="1.0" encoding="utf-8"?>
 <a:theme xmlns:a="http://schemas.openxmlformats.org/drawingml/2006/main" name="Office Theme">
   <a:themeElements>

</xml_diff>